<commit_message>
added project proposal ppt
</commit_message>
<xml_diff>
--- a/HMD.pptx
+++ b/HMD.pptx
@@ -5794,14 +5794,24 @@
           <a:lstStyle/>
           <a:p>
             <a:r>
-              <a:rPr lang="en-US" dirty="0">
+              <a:rPr lang="en-US">
                 <a:solidFill>
                   <a:srgbClr val="FFFFFF"/>
                 </a:solidFill>
                 <a:latin typeface="Times New Roman"/>
                 <a:cs typeface="Times New Roman"/>
               </a:rPr>
-              <a:t>Hira Afzal, Adnan Irshad</a:t>
+              <a:t>Adnan </a:t>
+            </a:r>
+            <a:r>
+              <a:rPr lang="en-US" dirty="0">
+                <a:solidFill>
+                  <a:srgbClr val="FFFFFF"/>
+                </a:solidFill>
+                <a:latin typeface="Times New Roman"/>
+                <a:cs typeface="Times New Roman"/>
+              </a:rPr>
+              <a:t>Irshad</a:t>
             </a:r>
           </a:p>
         </p:txBody>

</xml_diff>